<commit_message>
documentos requeridos para reporte de monitoreo 2016
</commit_message>
<xml_diff>
--- a/Proyectos/2016/Métricas y monitoreo/Reporte_monitoreo_160124.pptx
+++ b/Proyectos/2016/Métricas y monitoreo/Reporte_monitoreo_160124.pptx
@@ -28,7 +28,151 @@
 </p:presentation>
 </file>
 
-<file path=ppt/charts/chart1.xml><?xml version="1.0" encoding="utf-8"?>
+<file path=ppt/charts/chart10.xml><?xml version="1.0" encoding="utf-8"?>
+<c:chartSpace xmlns:c="http://schemas.openxmlformats.org/drawingml/2006/chart" xmlns:a="http://schemas.openxmlformats.org/drawingml/2006/main" xmlns:r="http://schemas.openxmlformats.org/officeDocument/2006/relationships">
+  <c:lang val="en-US"/>
+  <c:chart>
+    <c:plotArea>
+      <c:layout/>
+      <c:barChart>
+        <c:barDir val="col"/>
+        <c:grouping val="clustered"/>
+        <c:ser>
+          <c:idx val="0"/>
+          <c:order val="0"/>
+          <c:spPr>
+            <a:solidFill>
+              <a:srgbClr val="004586"/>
+            </a:solidFill>
+            <a:ln>
+              <a:noFill/>
+            </a:ln>
+          </c:spPr>
+          <c:dLbls>
+            <c:dLblPos val="ctr"/>
+            <c:showLegendKey val="0"/>
+            <c:showVal val="0"/>
+            <c:showCatName val="0"/>
+            <c:showSerName val="0"/>
+            <c:showPercent val="0"/>
+          </c:dLbls>
+          <c:cat>
+            <c:strRef>
+              <c:f>categories</c:f>
+              <c:strCache>
+                <c:ptCount val="1"/>
+                <c:pt idx="0">
+                  <c:v>Resultados</c:v>
+                </c:pt>
+              </c:strCache>
+            </c:strRef>
+          </c:cat>
+          <c:val>
+            <c:numRef>
+              <c:f>0</c:f>
+              <c:numCache>
+                <c:formatCode>General</c:formatCode>
+                <c:ptCount val="1"/>
+                <c:pt idx="0">
+                  <c:v>0.99</c:v>
+                </c:pt>
+              </c:numCache>
+            </c:numRef>
+          </c:val>
+        </c:ser>
+        <c:gapWidth val="100"/>
+        <c:overlap val="0"/>
+        <c:axId val="42726105"/>
+        <c:axId val="59301226"/>
+      </c:barChart>
+      <c:catAx>
+        <c:axId val="42726105"/>
+        <c:scaling>
+          <c:orientation val="minMax"/>
+        </c:scaling>
+        <c:delete val="0"/>
+        <c:axPos val="b"/>
+        <c:majorTickMark val="out"/>
+        <c:minorTickMark val="none"/>
+        <c:tickLblPos val="nextTo"/>
+        <c:spPr>
+          <a:ln w="9360">
+            <a:solidFill>
+              <a:srgbClr val="b3b3b3"/>
+            </a:solidFill>
+            <a:round/>
+          </a:ln>
+        </c:spPr>
+        <c:crossAx val="59301226"/>
+        <c:crosses val="autoZero"/>
+        <c:auto val="1"/>
+        <c:lblAlgn val="ctr"/>
+        <c:lblOffset val="100"/>
+      </c:catAx>
+      <c:valAx>
+        <c:axId val="59301226"/>
+        <c:scaling>
+          <c:orientation val="minMax"/>
+        </c:scaling>
+        <c:delete val="0"/>
+        <c:axPos val="l"/>
+        <c:majorGridlines>
+          <c:spPr>
+            <a:ln w="9360">
+              <a:solidFill>
+                <a:srgbClr val="b3b3b3"/>
+              </a:solidFill>
+              <a:round/>
+            </a:ln>
+          </c:spPr>
+        </c:majorGridlines>
+        <c:majorTickMark val="out"/>
+        <c:minorTickMark val="none"/>
+        <c:tickLblPos val="nextTo"/>
+        <c:spPr>
+          <a:ln w="9360">
+            <a:solidFill>
+              <a:srgbClr val="b3b3b3"/>
+            </a:solidFill>
+            <a:round/>
+          </a:ln>
+        </c:spPr>
+        <c:crossAx val="42726105"/>
+        <c:crosses val="autoZero"/>
+      </c:valAx>
+      <c:spPr>
+        <a:noFill/>
+        <a:ln>
+          <a:solidFill>
+            <a:srgbClr val="b3b3b3"/>
+          </a:solidFill>
+        </a:ln>
+      </c:spPr>
+    </c:plotArea>
+    <c:legend>
+      <c:legendPos val="r"/>
+      <c:overlay val="0"/>
+      <c:spPr>
+        <a:noFill/>
+        <a:ln>
+          <a:noFill/>
+        </a:ln>
+      </c:spPr>
+    </c:legend>
+    <c:plotVisOnly val="1"/>
+  </c:chart>
+  <c:spPr>
+    <a:solidFill>
+      <a:srgbClr val="ffffff"/>
+    </a:solidFill>
+    <a:ln>
+      <a:noFill/>
+    </a:ln>
+  </c:spPr>
+</c:chartSpace>
+</file>
+
+<file path=ppt/charts/chart6.xml><?xml version="1.0" encoding="utf-8"?>
 <c:chartSpace xmlns:c="http://schemas.openxmlformats.org/drawingml/2006/chart" xmlns:a="http://schemas.openxmlformats.org/drawingml/2006/main" xmlns:r="http://schemas.openxmlformats.org/officeDocument/2006/relationships">
   <c:lang val="en-US"/>
   <c:chart>
@@ -105,11 +249,11 @@
         </c:ser>
         <c:gapWidth val="100"/>
         <c:overlap val="0"/>
-        <c:axId val="34733449"/>
-        <c:axId val="43428182"/>
+        <c:axId val="98198517"/>
+        <c:axId val="43749327"/>
       </c:barChart>
       <c:catAx>
-        <c:axId val="34733449"/>
+        <c:axId val="98198517"/>
         <c:scaling>
           <c:orientation val="minMax"/>
         </c:scaling>
@@ -126,14 +270,14 @@
             <a:round/>
           </a:ln>
         </c:spPr>
-        <c:crossAx val="43428182"/>
+        <c:crossAx val="43749327"/>
         <c:crosses val="autoZero"/>
         <c:auto val="1"/>
         <c:lblAlgn val="ctr"/>
         <c:lblOffset val="100"/>
       </c:catAx>
       <c:valAx>
-        <c:axId val="43428182"/>
+        <c:axId val="43749327"/>
         <c:scaling>
           <c:orientation val="minMax"/>
         </c:scaling>
@@ -160,7 +304,7 @@
             <a:round/>
           </a:ln>
         </c:spPr>
-        <c:crossAx val="34733449"/>
+        <c:crossAx val="98198517"/>
         <c:crosses val="autoZero"/>
       </c:valAx>
       <c:spPr>
@@ -195,7 +339,7 @@
 </c:chartSpace>
 </file>
 
-<file path=ppt/charts/chart2.xml><?xml version="1.0" encoding="utf-8"?>
+<file path=ppt/charts/chart7.xml><?xml version="1.0" encoding="utf-8"?>
 <c:chartSpace xmlns:c="http://schemas.openxmlformats.org/drawingml/2006/chart" xmlns:a="http://schemas.openxmlformats.org/drawingml/2006/main" xmlns:r="http://schemas.openxmlformats.org/officeDocument/2006/relationships">
   <c:lang val="en-US"/>
   <c:chart>
@@ -272,11 +416,11 @@
         </c:ser>
         <c:gapWidth val="100"/>
         <c:overlap val="0"/>
-        <c:axId val="84433076"/>
-        <c:axId val="35691075"/>
+        <c:axId val="27868636"/>
+        <c:axId val="38372078"/>
       </c:barChart>
       <c:catAx>
-        <c:axId val="84433076"/>
+        <c:axId val="27868636"/>
         <c:scaling>
           <c:orientation val="minMax"/>
         </c:scaling>
@@ -293,14 +437,14 @@
             <a:round/>
           </a:ln>
         </c:spPr>
-        <c:crossAx val="35691075"/>
+        <c:crossAx val="38372078"/>
         <c:crosses val="autoZero"/>
         <c:auto val="1"/>
         <c:lblAlgn val="ctr"/>
         <c:lblOffset val="100"/>
       </c:catAx>
       <c:valAx>
-        <c:axId val="35691075"/>
+        <c:axId val="38372078"/>
         <c:scaling>
           <c:orientation val="minMax"/>
         </c:scaling>
@@ -327,7 +471,7 @@
             <a:round/>
           </a:ln>
         </c:spPr>
-        <c:crossAx val="84433076"/>
+        <c:crossAx val="27868636"/>
         <c:crosses val="autoZero"/>
       </c:valAx>
       <c:spPr>
@@ -362,7 +506,7 @@
 </c:chartSpace>
 </file>
 
-<file path=ppt/charts/chart3.xml><?xml version="1.0" encoding="utf-8"?>
+<file path=ppt/charts/chart8.xml><?xml version="1.0" encoding="utf-8"?>
 <c:chartSpace xmlns:c="http://schemas.openxmlformats.org/drawingml/2006/chart" xmlns:a="http://schemas.openxmlformats.org/drawingml/2006/main" xmlns:r="http://schemas.openxmlformats.org/officeDocument/2006/relationships">
   <c:lang val="en-US"/>
   <c:chart>
@@ -439,11 +583,11 @@
         </c:ser>
         <c:gapWidth val="100"/>
         <c:overlap val="0"/>
-        <c:axId val="80211551"/>
-        <c:axId val="10715389"/>
+        <c:axId val="4364397"/>
+        <c:axId val="19729533"/>
       </c:barChart>
       <c:catAx>
-        <c:axId val="80211551"/>
+        <c:axId val="4364397"/>
         <c:scaling>
           <c:orientation val="minMax"/>
         </c:scaling>
@@ -460,14 +604,14 @@
             <a:round/>
           </a:ln>
         </c:spPr>
-        <c:crossAx val="10715389"/>
+        <c:crossAx val="19729533"/>
         <c:crosses val="autoZero"/>
         <c:auto val="1"/>
         <c:lblAlgn val="ctr"/>
         <c:lblOffset val="100"/>
       </c:catAx>
       <c:valAx>
-        <c:axId val="10715389"/>
+        <c:axId val="19729533"/>
         <c:scaling>
           <c:orientation val="minMax"/>
         </c:scaling>
@@ -494,7 +638,7 @@
             <a:round/>
           </a:ln>
         </c:spPr>
-        <c:crossAx val="80211551"/>
+        <c:crossAx val="4364397"/>
         <c:crosses val="autoZero"/>
       </c:valAx>
       <c:spPr>
@@ -529,7 +673,7 @@
 </c:chartSpace>
 </file>
 
-<file path=ppt/charts/chart4.xml><?xml version="1.0" encoding="utf-8"?>
+<file path=ppt/charts/chart9.xml><?xml version="1.0" encoding="utf-8"?>
 <c:chartSpace xmlns:c="http://schemas.openxmlformats.org/drawingml/2006/chart" xmlns:a="http://schemas.openxmlformats.org/drawingml/2006/main" xmlns:r="http://schemas.openxmlformats.org/officeDocument/2006/relationships">
   <c:lang val="en-US"/>
   <c:chart>
@@ -606,11 +750,11 @@
         </c:ser>
         <c:gapWidth val="100"/>
         <c:overlap val="0"/>
-        <c:axId val="33732453"/>
-        <c:axId val="80557867"/>
+        <c:axId val="8478426"/>
+        <c:axId val="68361334"/>
       </c:barChart>
       <c:catAx>
-        <c:axId val="33732453"/>
+        <c:axId val="8478426"/>
         <c:scaling>
           <c:orientation val="minMax"/>
         </c:scaling>
@@ -627,14 +771,14 @@
             <a:round/>
           </a:ln>
         </c:spPr>
-        <c:crossAx val="80557867"/>
+        <c:crossAx val="68361334"/>
         <c:crosses val="autoZero"/>
         <c:auto val="1"/>
         <c:lblAlgn val="ctr"/>
         <c:lblOffset val="100"/>
       </c:catAx>
       <c:valAx>
-        <c:axId val="80557867"/>
+        <c:axId val="68361334"/>
         <c:scaling>
           <c:orientation val="minMax"/>
         </c:scaling>
@@ -661,151 +805,7 @@
             <a:round/>
           </a:ln>
         </c:spPr>
-        <c:crossAx val="33732453"/>
-        <c:crosses val="autoZero"/>
-      </c:valAx>
-      <c:spPr>
-        <a:noFill/>
-        <a:ln>
-          <a:solidFill>
-            <a:srgbClr val="b3b3b3"/>
-          </a:solidFill>
-        </a:ln>
-      </c:spPr>
-    </c:plotArea>
-    <c:legend>
-      <c:legendPos val="r"/>
-      <c:overlay val="0"/>
-      <c:spPr>
-        <a:noFill/>
-        <a:ln>
-          <a:noFill/>
-        </a:ln>
-      </c:spPr>
-    </c:legend>
-    <c:plotVisOnly val="1"/>
-  </c:chart>
-  <c:spPr>
-    <a:solidFill>
-      <a:srgbClr val="ffffff"/>
-    </a:solidFill>
-    <a:ln>
-      <a:noFill/>
-    </a:ln>
-  </c:spPr>
-</c:chartSpace>
-</file>
-
-<file path=ppt/charts/chart5.xml><?xml version="1.0" encoding="utf-8"?>
-<c:chartSpace xmlns:c="http://schemas.openxmlformats.org/drawingml/2006/chart" xmlns:a="http://schemas.openxmlformats.org/drawingml/2006/main" xmlns:r="http://schemas.openxmlformats.org/officeDocument/2006/relationships">
-  <c:lang val="en-US"/>
-  <c:chart>
-    <c:plotArea>
-      <c:layout/>
-      <c:barChart>
-        <c:barDir val="col"/>
-        <c:grouping val="clustered"/>
-        <c:ser>
-          <c:idx val="0"/>
-          <c:order val="0"/>
-          <c:spPr>
-            <a:solidFill>
-              <a:srgbClr val="004586"/>
-            </a:solidFill>
-            <a:ln>
-              <a:noFill/>
-            </a:ln>
-          </c:spPr>
-          <c:dLbls>
-            <c:dLblPos val="ctr"/>
-            <c:showLegendKey val="0"/>
-            <c:showVal val="0"/>
-            <c:showCatName val="0"/>
-            <c:showSerName val="0"/>
-            <c:showPercent val="0"/>
-          </c:dLbls>
-          <c:cat>
-            <c:strRef>
-              <c:f>categories</c:f>
-              <c:strCache>
-                <c:ptCount val="1"/>
-                <c:pt idx="0">
-                  <c:v>Resultados</c:v>
-                </c:pt>
-              </c:strCache>
-            </c:strRef>
-          </c:cat>
-          <c:val>
-            <c:numRef>
-              <c:f>0</c:f>
-              <c:numCache>
-                <c:formatCode>General</c:formatCode>
-                <c:ptCount val="1"/>
-                <c:pt idx="0">
-                  <c:v>0.99</c:v>
-                </c:pt>
-              </c:numCache>
-            </c:numRef>
-          </c:val>
-        </c:ser>
-        <c:gapWidth val="100"/>
-        <c:overlap val="0"/>
-        <c:axId val="28211172"/>
-        <c:axId val="2762903"/>
-      </c:barChart>
-      <c:catAx>
-        <c:axId val="28211172"/>
-        <c:scaling>
-          <c:orientation val="minMax"/>
-        </c:scaling>
-        <c:delete val="0"/>
-        <c:axPos val="b"/>
-        <c:majorTickMark val="out"/>
-        <c:minorTickMark val="none"/>
-        <c:tickLblPos val="nextTo"/>
-        <c:spPr>
-          <a:ln w="9360">
-            <a:solidFill>
-              <a:srgbClr val="b3b3b3"/>
-            </a:solidFill>
-            <a:round/>
-          </a:ln>
-        </c:spPr>
-        <c:crossAx val="2762903"/>
-        <c:crosses val="autoZero"/>
-        <c:auto val="1"/>
-        <c:lblAlgn val="ctr"/>
-        <c:lblOffset val="100"/>
-      </c:catAx>
-      <c:valAx>
-        <c:axId val="2762903"/>
-        <c:scaling>
-          <c:orientation val="minMax"/>
-        </c:scaling>
-        <c:delete val="0"/>
-        <c:axPos val="l"/>
-        <c:majorGridlines>
-          <c:spPr>
-            <a:ln w="9360">
-              <a:solidFill>
-                <a:srgbClr val="b3b3b3"/>
-              </a:solidFill>
-              <a:round/>
-            </a:ln>
-          </c:spPr>
-        </c:majorGridlines>
-        <c:majorTickMark val="out"/>
-        <c:minorTickMark val="none"/>
-        <c:tickLblPos val="nextTo"/>
-        <c:spPr>
-          <a:ln w="9360">
-            <a:solidFill>
-              <a:srgbClr val="b3b3b3"/>
-            </a:solidFill>
-            <a:round/>
-          </a:ln>
-        </c:spPr>
-        <c:crossAx val="28211172"/>
+        <c:crossAx val="8478426"/>
         <c:crosses val="autoZero"/>
       </c:valAx>
       <c:spPr>
@@ -3184,7 +3184,7 @@
         <p:spPr>
           <a:xfrm>
             <a:off x="777240" y="0"/>
-            <a:ext cx="7539120" cy="376200"/>
+            <a:ext cx="7538760" cy="375840"/>
           </a:xfrm>
           <a:prstGeom prst="rect">
             <a:avLst/>
@@ -3217,7 +3217,7 @@
         <p:spPr>
           <a:xfrm>
             <a:off x="777240" y="6172200"/>
-            <a:ext cx="7539120" cy="22680"/>
+            <a:ext cx="7538760" cy="22320"/>
           </a:xfrm>
           <a:prstGeom prst="rect">
             <a:avLst/>
@@ -3451,7 +3451,7 @@
         <p:spPr>
           <a:xfrm>
             <a:off x="777240" y="0"/>
-            <a:ext cx="7539120" cy="376200"/>
+            <a:ext cx="7538760" cy="375840"/>
           </a:xfrm>
           <a:prstGeom prst="rect">
             <a:avLst/>
@@ -3484,7 +3484,7 @@
         <p:spPr>
           <a:xfrm>
             <a:off x="777240" y="6172200"/>
-            <a:ext cx="7539120" cy="22680"/>
+            <a:ext cx="7538760" cy="22320"/>
           </a:xfrm>
           <a:prstGeom prst="rect">
             <a:avLst/>
@@ -3708,7 +3708,7 @@
         <p:spPr>
           <a:xfrm>
             <a:off x="1012680" y="2282760"/>
-            <a:ext cx="7766280" cy="1463760"/>
+            <a:ext cx="7765920" cy="1463400"/>
           </a:xfrm>
           <a:prstGeom prst="rect">
             <a:avLst/>
@@ -3734,7 +3734,7 @@
         <p:spPr>
           <a:xfrm>
             <a:off x="457200" y="501840"/>
-            <a:ext cx="8028000" cy="1139400"/>
+            <a:ext cx="8027640" cy="1139040"/>
           </a:xfrm>
           <a:prstGeom prst="rect">
             <a:avLst/>
@@ -3781,7 +3781,7 @@
         <p:spPr>
           <a:xfrm>
             <a:off x="457200" y="1604520"/>
-            <a:ext cx="3920760" cy="3971880"/>
+            <a:ext cx="3920400" cy="3971520"/>
           </a:xfrm>
           <a:prstGeom prst="rect">
             <a:avLst/>
@@ -3904,7 +3904,7 @@
         <p:spPr>
           <a:xfrm>
             <a:off x="6948360" y="1196640"/>
-            <a:ext cx="1909800" cy="1890720"/>
+            <a:ext cx="1909440" cy="1890360"/>
           </a:xfrm>
           <a:prstGeom prst="rect">
             <a:avLst/>
@@ -3982,7 +3982,7 @@
         <p:spPr>
           <a:xfrm>
             <a:off x="457200" y="274680"/>
-            <a:ext cx="8223480" cy="1136880"/>
+            <a:ext cx="8223120" cy="1136520"/>
           </a:xfrm>
           <a:prstGeom prst="rect">
             <a:avLst/>
@@ -4029,7 +4029,7 @@
         <p:spPr>
           <a:xfrm>
             <a:off x="457200" y="1600200"/>
-            <a:ext cx="8223480" cy="4519800"/>
+            <a:ext cx="8223120" cy="4519440"/>
           </a:xfrm>
           <a:prstGeom prst="rect">
             <a:avLst/>
@@ -4055,7 +4055,7 @@
         <p:spPr>
           <a:xfrm>
             <a:off x="6365160" y="1124640"/>
-            <a:ext cx="2282040" cy="3103560"/>
+            <a:ext cx="2281680" cy="3103200"/>
           </a:xfrm>
           <a:prstGeom prst="rect">
             <a:avLst/>
@@ -4109,7 +4109,7 @@
         </p:nvGraphicFramePr>
         <p:xfrm>
           <a:off x="504720" y="1224000"/>
-          <a:ext cx="5758200" cy="3238200"/>
+          <a:ext cx="5757840" cy="3237840"/>
         </p:xfrm>
         <a:graphic>
           <a:graphicData uri="http://schemas.openxmlformats.org/drawingml/2006/chart">
@@ -4185,7 +4185,7 @@
         <p:spPr>
           <a:xfrm>
             <a:off x="457200" y="274680"/>
-            <a:ext cx="8223480" cy="1136880"/>
+            <a:ext cx="8223120" cy="1136520"/>
           </a:xfrm>
           <a:prstGeom prst="rect">
             <a:avLst/>
@@ -4232,7 +4232,7 @@
         <p:spPr>
           <a:xfrm>
             <a:off x="457200" y="1600200"/>
-            <a:ext cx="8223480" cy="4519800"/>
+            <a:ext cx="8223120" cy="4519440"/>
           </a:xfrm>
           <a:prstGeom prst="rect">
             <a:avLst/>
@@ -4258,7 +4258,7 @@
         <p:spPr>
           <a:xfrm>
             <a:off x="6183360" y="1416240"/>
-            <a:ext cx="2497320" cy="2829240"/>
+            <a:ext cx="2496960" cy="2828880"/>
           </a:xfrm>
           <a:prstGeom prst="rect">
             <a:avLst/>
@@ -4328,7 +4328,7 @@
         </p:nvGraphicFramePr>
         <p:xfrm>
           <a:off x="288000" y="1440720"/>
-          <a:ext cx="5758200" cy="3238200"/>
+          <a:ext cx="5757840" cy="3237840"/>
         </p:xfrm>
         <a:graphic>
           <a:graphicData uri="http://schemas.openxmlformats.org/drawingml/2006/chart">
@@ -4404,7 +4404,7 @@
         <p:spPr>
           <a:xfrm>
             <a:off x="457200" y="274680"/>
-            <a:ext cx="8223480" cy="1136880"/>
+            <a:ext cx="8223120" cy="1136520"/>
           </a:xfrm>
           <a:prstGeom prst="rect">
             <a:avLst/>
@@ -4451,7 +4451,7 @@
         <p:spPr>
           <a:xfrm>
             <a:off x="457200" y="1600200"/>
-            <a:ext cx="8223480" cy="4519800"/>
+            <a:ext cx="8223120" cy="4519440"/>
           </a:xfrm>
           <a:prstGeom prst="rect">
             <a:avLst/>
@@ -4477,7 +4477,7 @@
         <p:spPr>
           <a:xfrm>
             <a:off x="6647040" y="1357920"/>
-            <a:ext cx="2282040" cy="3103560"/>
+            <a:ext cx="2281680" cy="3103200"/>
           </a:xfrm>
           <a:prstGeom prst="rect">
             <a:avLst/>
@@ -4531,7 +4531,7 @@
         </p:nvGraphicFramePr>
         <p:xfrm>
           <a:off x="3672000" y="4104000"/>
-          <a:ext cx="5470920" cy="2878920"/>
+          <a:ext cx="5470560" cy="2878560"/>
         </p:xfrm>
         <a:graphic>
           <a:graphicData uri="http://schemas.openxmlformats.org/drawingml/2006/chart">
@@ -4552,7 +4552,7 @@
         <p:spPr>
           <a:xfrm>
             <a:off x="72000" y="1152000"/>
-            <a:ext cx="5902920" cy="3561120"/>
+            <a:ext cx="5902560" cy="3560760"/>
           </a:xfrm>
           <a:prstGeom prst="rect">
             <a:avLst/>
@@ -4630,7 +4630,7 @@
         <p:spPr>
           <a:xfrm>
             <a:off x="457200" y="274680"/>
-            <a:ext cx="8223480" cy="1136880"/>
+            <a:ext cx="8223120" cy="1136520"/>
           </a:xfrm>
           <a:prstGeom prst="rect">
             <a:avLst/>
@@ -4677,7 +4677,7 @@
         <p:spPr>
           <a:xfrm>
             <a:off x="457200" y="1600200"/>
-            <a:ext cx="8223480" cy="4519800"/>
+            <a:ext cx="8223120" cy="4519440"/>
           </a:xfrm>
           <a:prstGeom prst="rect">
             <a:avLst/>
@@ -4703,7 +4703,7 @@
         <p:spPr>
           <a:xfrm>
             <a:off x="163080" y="1113480"/>
-            <a:ext cx="8761320" cy="2554920"/>
+            <a:ext cx="8760960" cy="2554560"/>
           </a:xfrm>
           <a:prstGeom prst="rect">
             <a:avLst/>
@@ -4762,7 +4762,7 @@
         <p:spPr>
           <a:xfrm>
             <a:off x="72000" y="1929240"/>
-            <a:ext cx="4638240" cy="3181680"/>
+            <a:ext cx="4637880" cy="3181320"/>
           </a:xfrm>
           <a:prstGeom prst="rect">
             <a:avLst/>
@@ -4780,7 +4780,7 @@
         </p:nvGraphicFramePr>
         <p:xfrm>
           <a:off x="4824000" y="4608000"/>
-          <a:ext cx="4246920" cy="2230200"/>
+          <a:ext cx="4246560" cy="2229840"/>
         </p:xfrm>
         <a:graphic>
           <a:graphicData uri="http://schemas.openxmlformats.org/drawingml/2006/chart">
@@ -4856,7 +4856,7 @@
         <p:spPr>
           <a:xfrm>
             <a:off x="457200" y="274680"/>
-            <a:ext cx="8223480" cy="1136880"/>
+            <a:ext cx="8223120" cy="1136520"/>
           </a:xfrm>
           <a:prstGeom prst="rect">
             <a:avLst/>
@@ -4903,7 +4903,7 @@
         <p:spPr>
           <a:xfrm>
             <a:off x="457200" y="1600200"/>
-            <a:ext cx="8223480" cy="4519800"/>
+            <a:ext cx="8223120" cy="4519440"/>
           </a:xfrm>
           <a:prstGeom prst="rect">
             <a:avLst/>
@@ -4929,7 +4929,7 @@
         <p:spPr>
           <a:xfrm>
             <a:off x="6890760" y="1124640"/>
-            <a:ext cx="1849320" cy="3377880"/>
+            <a:ext cx="1848960" cy="3377520"/>
           </a:xfrm>
           <a:prstGeom prst="rect">
             <a:avLst/>
@@ -5043,7 +5043,7 @@
         <p:spPr>
           <a:xfrm>
             <a:off x="457200" y="274680"/>
-            <a:ext cx="8223480" cy="1136880"/>
+            <a:ext cx="8223120" cy="1136520"/>
           </a:xfrm>
           <a:prstGeom prst="rect">
             <a:avLst/>
@@ -5090,7 +5090,7 @@
         <p:spPr>
           <a:xfrm>
             <a:off x="457200" y="1600200"/>
-            <a:ext cx="8223480" cy="4519800"/>
+            <a:ext cx="8223120" cy="4519440"/>
           </a:xfrm>
           <a:prstGeom prst="rect">
             <a:avLst/>
@@ -5116,7 +5116,7 @@
         <p:spPr>
           <a:xfrm>
             <a:off x="5751360" y="1412640"/>
-            <a:ext cx="2929320" cy="2280600"/>
+            <a:ext cx="2928960" cy="2280240"/>
           </a:xfrm>
           <a:prstGeom prst="rect">
             <a:avLst/>
@@ -5170,7 +5170,7 @@
         </p:nvGraphicFramePr>
         <p:xfrm>
           <a:off x="432000" y="2952720"/>
-          <a:ext cx="5758200" cy="3238200"/>
+          <a:ext cx="5757840" cy="3237840"/>
         </p:xfrm>
         <a:graphic>
           <a:graphicData uri="http://schemas.openxmlformats.org/drawingml/2006/chart">
@@ -5246,7 +5246,7 @@
         <p:spPr>
           <a:xfrm>
             <a:off x="457200" y="273600"/>
-            <a:ext cx="8226720" cy="1142280"/>
+            <a:ext cx="8226360" cy="1141920"/>
           </a:xfrm>
           <a:prstGeom prst="rect">
             <a:avLst/>
@@ -5419,7 +5419,7 @@
         <p:spPr>
           <a:xfrm>
             <a:off x="1152000" y="3960000"/>
-            <a:ext cx="3093480" cy="599760"/>
+            <a:ext cx="3093120" cy="599400"/>
           </a:xfrm>
           <a:prstGeom prst="rect">
             <a:avLst/>
@@ -5510,7 +5510,7 @@
         <p:spPr>
           <a:xfrm>
             <a:off x="432000" y="12600"/>
-            <a:ext cx="8223480" cy="1136880"/>
+            <a:ext cx="8223120" cy="1136520"/>
           </a:xfrm>
           <a:prstGeom prst="rect">
             <a:avLst/>
@@ -5557,7 +5557,7 @@
         <p:spPr>
           <a:xfrm>
             <a:off x="457200" y="1600200"/>
-            <a:ext cx="8223480" cy="4519800"/>
+            <a:ext cx="8223120" cy="4519440"/>
           </a:xfrm>
           <a:prstGeom prst="rect">
             <a:avLst/>
@@ -6300,7 +6300,7 @@
         <p:spPr>
           <a:xfrm>
             <a:off x="432000" y="12600"/>
-            <a:ext cx="8223480" cy="1136880"/>
+            <a:ext cx="8223120" cy="1136520"/>
           </a:xfrm>
           <a:prstGeom prst="rect">
             <a:avLst/>
@@ -6347,7 +6347,7 @@
         <p:spPr>
           <a:xfrm>
             <a:off x="457200" y="1600200"/>
-            <a:ext cx="8223480" cy="4519800"/>
+            <a:ext cx="8223120" cy="4519440"/>
           </a:xfrm>
           <a:prstGeom prst="rect">
             <a:avLst/>
@@ -7090,7 +7090,7 @@
         <p:spPr>
           <a:xfrm>
             <a:off x="432000" y="12600"/>
-            <a:ext cx="8223480" cy="1136880"/>
+            <a:ext cx="8223120" cy="1136520"/>
           </a:xfrm>
           <a:prstGeom prst="rect">
             <a:avLst/>
@@ -7137,7 +7137,7 @@
         <p:spPr>
           <a:xfrm>
             <a:off x="457200" y="1600200"/>
-            <a:ext cx="8223480" cy="4519800"/>
+            <a:ext cx="8223120" cy="4519440"/>
           </a:xfrm>
           <a:prstGeom prst="rect">
             <a:avLst/>
@@ -7880,7 +7880,7 @@
         <p:spPr>
           <a:xfrm>
             <a:off x="432000" y="12600"/>
-            <a:ext cx="8223480" cy="1136880"/>
+            <a:ext cx="8223120" cy="1136520"/>
           </a:xfrm>
           <a:prstGeom prst="rect">
             <a:avLst/>
@@ -7927,7 +7927,7 @@
         <p:spPr>
           <a:xfrm>
             <a:off x="457200" y="1600200"/>
-            <a:ext cx="8223480" cy="4519800"/>
+            <a:ext cx="8223120" cy="4519440"/>
           </a:xfrm>
           <a:prstGeom prst="rect">
             <a:avLst/>
@@ -8247,7 +8247,7 @@
         <p:spPr>
           <a:xfrm>
             <a:off x="457200" y="274680"/>
-            <a:ext cx="8223480" cy="1136880"/>
+            <a:ext cx="8223120" cy="1136520"/>
           </a:xfrm>
           <a:prstGeom prst="rect">
             <a:avLst/>
@@ -8294,7 +8294,7 @@
         <p:spPr>
           <a:xfrm>
             <a:off x="457200" y="1600200"/>
-            <a:ext cx="8223480" cy="4519800"/>
+            <a:ext cx="8223120" cy="4519440"/>
           </a:xfrm>
           <a:prstGeom prst="rect">
             <a:avLst/>
@@ -8338,7 +8338,7 @@
         </p:nvGraphicFramePr>
         <p:xfrm>
           <a:off x="36360" y="1579680"/>
-          <a:ext cx="9078120" cy="4461480"/>
+          <a:ext cx="9078120" cy="4461120"/>
         </p:xfrm>
         <a:graphic>
           <a:graphicData uri="http://schemas.openxmlformats.org/drawingml/2006/table">
@@ -8901,7 +8901,7 @@
                   <a:tcPr/>
                 </a:tc>
               </a:tr>
-              <a:tr h="612360">
+              <a:tr h="612000">
                 <a:tc>
                   <a:txBody>
                     <a:bodyPr/>
@@ -9050,7 +9050,7 @@
         <p:spPr>
           <a:xfrm>
             <a:off x="576000" y="1080000"/>
-            <a:ext cx="7988400" cy="598680"/>
+            <a:ext cx="7988040" cy="598320"/>
           </a:xfrm>
           <a:prstGeom prst="rect">
             <a:avLst/>
@@ -9141,7 +9141,7 @@
         <p:spPr>
           <a:xfrm>
             <a:off x="457200" y="274680"/>
-            <a:ext cx="8223480" cy="1136880"/>
+            <a:ext cx="8223120" cy="1136520"/>
           </a:xfrm>
           <a:prstGeom prst="rect">
             <a:avLst/>
@@ -9188,7 +9188,7 @@
         <p:spPr>
           <a:xfrm>
             <a:off x="457200" y="1600200"/>
-            <a:ext cx="8223480" cy="4519800"/>
+            <a:ext cx="8223120" cy="4519440"/>
           </a:xfrm>
           <a:prstGeom prst="rect">
             <a:avLst/>
@@ -9214,7 +9214,7 @@
         <p:spPr>
           <a:xfrm>
             <a:off x="792000" y="3990240"/>
-            <a:ext cx="7987680" cy="2280600"/>
+            <a:ext cx="7987320" cy="2280240"/>
           </a:xfrm>
           <a:prstGeom prst="rect">
             <a:avLst/>
@@ -9284,7 +9284,7 @@
         </p:nvGraphicFramePr>
         <p:xfrm>
           <a:off x="569880" y="1117800"/>
-          <a:ext cx="8285760" cy="2689920"/>
+          <a:ext cx="8285760" cy="3037680"/>
         </p:xfrm>
         <a:graphic>
           <a:graphicData uri="http://schemas.openxmlformats.org/drawingml/2006/table">
@@ -9918,7 +9918,7 @@
                     <a:bodyPr/>
                     <a:p>
                       <a:r>
-                        <a:rPr lang="es-MX" sz="2400">
+                        <a:rPr lang="es-MX" sz="2400" strike="noStrike">
                           <a:latin typeface="Times New Roman"/>
                         </a:rPr>
                         <a:t>Totales</a:t>
@@ -9933,7 +9933,7 @@
                     <a:bodyPr/>
                     <a:p>
                       <a:r>
-                        <a:rPr lang="es-MX" sz="2400">
+                        <a:rPr lang="es-MX" sz="2400" strike="noStrike">
                           <a:latin typeface="Times New Roman"/>
                         </a:rPr>
                         <a:t>$1334.97</a:t>
@@ -9948,7 +9948,7 @@
                     <a:bodyPr/>
                     <a:p>
                       <a:r>
-                        <a:rPr lang="es-MX" sz="2400">
+                        <a:rPr lang="es-MX" sz="2400" strike="noStrike">
                           <a:latin typeface="Times New Roman"/>
                         </a:rPr>
                         <a:t>959.63</a:t>
@@ -10034,7 +10034,7 @@
         <p:spPr>
           <a:xfrm>
             <a:off x="457200" y="274680"/>
-            <a:ext cx="8223480" cy="1136880"/>
+            <a:ext cx="8223120" cy="1136520"/>
           </a:xfrm>
           <a:prstGeom prst="rect">
             <a:avLst/>
@@ -10081,7 +10081,7 @@
         <p:spPr>
           <a:xfrm>
             <a:off x="457200" y="1600200"/>
-            <a:ext cx="8223480" cy="4519800"/>
+            <a:ext cx="8223120" cy="4519440"/>
           </a:xfrm>
           <a:prstGeom prst="rect">
             <a:avLst/>
@@ -10107,7 +10107,7 @@
         <p:spPr>
           <a:xfrm>
             <a:off x="864000" y="4388040"/>
-            <a:ext cx="5973840" cy="1731960"/>
+            <a:ext cx="5973480" cy="1731600"/>
           </a:xfrm>
           <a:prstGeom prst="rect">
             <a:avLst/>
@@ -10153,7 +10153,7 @@
         </p:nvGraphicFramePr>
         <p:xfrm>
           <a:off x="160920" y="1185120"/>
-          <a:ext cx="8521560" cy="2689920"/>
+          <a:ext cx="8521560" cy="3037680"/>
         </p:xfrm>
         <a:graphic>
           <a:graphicData uri="http://schemas.openxmlformats.org/drawingml/2006/table">
@@ -10700,7 +10700,7 @@
                     <a:bodyPr/>
                     <a:p>
                       <a:r>
-                        <a:rPr lang="es-MX" sz="2400">
+                        <a:rPr lang="es-MX" sz="2400" strike="noStrike">
                           <a:latin typeface="Times New Roman"/>
                         </a:rPr>
                         <a:t>Totales</a:t>
@@ -10715,7 +10715,7 @@
                     <a:bodyPr/>
                     <a:p>
                       <a:r>
-                        <a:rPr lang="es-MX" sz="2400">
+                        <a:rPr lang="es-MX" sz="2400" strike="noStrike">
                           <a:latin typeface="Times New Roman"/>
                         </a:rPr>
                         <a:t>5466min</a:t>
@@ -10730,7 +10730,7 @@
                     <a:bodyPr/>
                     <a:p>
                       <a:r>
-                        <a:rPr lang="es-MX" sz="2400">
+                        <a:rPr lang="es-MX" sz="2400" strike="noStrike">
                           <a:latin typeface="Times New Roman"/>
                         </a:rPr>
                         <a:t>4297min</a:t>

</xml_diff>

<commit_message>
cambios en revision de aufitoria y reporte de proyecto multiples
</commit_message>
<xml_diff>
--- a/Proyectos/2016/Métricas y monitoreo/Reporte_monitoreo_160124.pptx
+++ b/Proyectos/2016/Métricas y monitoreo/Reporte_monitoreo_160124.pptx
@@ -28,151 +28,7 @@
 </p:presentation>
 </file>
 
-<file path=ppt/charts/chart10.xml><?xml version="1.0" encoding="utf-8"?>
-<c:chartSpace xmlns:c="http://schemas.openxmlformats.org/drawingml/2006/chart" xmlns:a="http://schemas.openxmlformats.org/drawingml/2006/main" xmlns:r="http://schemas.openxmlformats.org/officeDocument/2006/relationships">
-  <c:lang val="en-US"/>
-  <c:chart>
-    <c:plotArea>
-      <c:layout/>
-      <c:barChart>
-        <c:barDir val="col"/>
-        <c:grouping val="clustered"/>
-        <c:ser>
-          <c:idx val="0"/>
-          <c:order val="0"/>
-          <c:spPr>
-            <a:solidFill>
-              <a:srgbClr val="004586"/>
-            </a:solidFill>
-            <a:ln>
-              <a:noFill/>
-            </a:ln>
-          </c:spPr>
-          <c:dLbls>
-            <c:dLblPos val="ctr"/>
-            <c:showLegendKey val="0"/>
-            <c:showVal val="0"/>
-            <c:showCatName val="0"/>
-            <c:showSerName val="0"/>
-            <c:showPercent val="0"/>
-          </c:dLbls>
-          <c:cat>
-            <c:strRef>
-              <c:f>categories</c:f>
-              <c:strCache>
-                <c:ptCount val="1"/>
-                <c:pt idx="0">
-                  <c:v>Resultados</c:v>
-                </c:pt>
-              </c:strCache>
-            </c:strRef>
-          </c:cat>
-          <c:val>
-            <c:numRef>
-              <c:f>0</c:f>
-              <c:numCache>
-                <c:formatCode>General</c:formatCode>
-                <c:ptCount val="1"/>
-                <c:pt idx="0">
-                  <c:v>0.99</c:v>
-                </c:pt>
-              </c:numCache>
-            </c:numRef>
-          </c:val>
-        </c:ser>
-        <c:gapWidth val="100"/>
-        <c:overlap val="0"/>
-        <c:axId val="42726105"/>
-        <c:axId val="59301226"/>
-      </c:barChart>
-      <c:catAx>
-        <c:axId val="42726105"/>
-        <c:scaling>
-          <c:orientation val="minMax"/>
-        </c:scaling>
-        <c:delete val="0"/>
-        <c:axPos val="b"/>
-        <c:majorTickMark val="out"/>
-        <c:minorTickMark val="none"/>
-        <c:tickLblPos val="nextTo"/>
-        <c:spPr>
-          <a:ln w="9360">
-            <a:solidFill>
-              <a:srgbClr val="b3b3b3"/>
-            </a:solidFill>
-            <a:round/>
-          </a:ln>
-        </c:spPr>
-        <c:crossAx val="59301226"/>
-        <c:crosses val="autoZero"/>
-        <c:auto val="1"/>
-        <c:lblAlgn val="ctr"/>
-        <c:lblOffset val="100"/>
-      </c:catAx>
-      <c:valAx>
-        <c:axId val="59301226"/>
-        <c:scaling>
-          <c:orientation val="minMax"/>
-        </c:scaling>
-        <c:delete val="0"/>
-        <c:axPos val="l"/>
-        <c:majorGridlines>
-          <c:spPr>
-            <a:ln w="9360">
-              <a:solidFill>
-                <a:srgbClr val="b3b3b3"/>
-              </a:solidFill>
-              <a:round/>
-            </a:ln>
-          </c:spPr>
-        </c:majorGridlines>
-        <c:majorTickMark val="out"/>
-        <c:minorTickMark val="none"/>
-        <c:tickLblPos val="nextTo"/>
-        <c:spPr>
-          <a:ln w="9360">
-            <a:solidFill>
-              <a:srgbClr val="b3b3b3"/>
-            </a:solidFill>
-            <a:round/>
-          </a:ln>
-        </c:spPr>
-        <c:crossAx val="42726105"/>
-        <c:crosses val="autoZero"/>
-      </c:valAx>
-      <c:spPr>
-        <a:noFill/>
-        <a:ln>
-          <a:solidFill>
-            <a:srgbClr val="b3b3b3"/>
-          </a:solidFill>
-        </a:ln>
-      </c:spPr>
-    </c:plotArea>
-    <c:legend>
-      <c:legendPos val="r"/>
-      <c:overlay val="0"/>
-      <c:spPr>
-        <a:noFill/>
-        <a:ln>
-          <a:noFill/>
-        </a:ln>
-      </c:spPr>
-    </c:legend>
-    <c:plotVisOnly val="1"/>
-  </c:chart>
-  <c:spPr>
-    <a:solidFill>
-      <a:srgbClr val="ffffff"/>
-    </a:solidFill>
-    <a:ln>
-      <a:noFill/>
-    </a:ln>
-  </c:spPr>
-</c:chartSpace>
-</file>
-
-<file path=ppt/charts/chart6.xml><?xml version="1.0" encoding="utf-8"?>
+<file path=ppt/charts/chart1.xml><?xml version="1.0" encoding="utf-8"?>
 <c:chartSpace xmlns:c="http://schemas.openxmlformats.org/drawingml/2006/chart" xmlns:a="http://schemas.openxmlformats.org/drawingml/2006/main" xmlns:r="http://schemas.openxmlformats.org/officeDocument/2006/relationships">
   <c:lang val="en-US"/>
   <c:chart>
@@ -249,11 +105,11 @@
         </c:ser>
         <c:gapWidth val="100"/>
         <c:overlap val="0"/>
-        <c:axId val="98198517"/>
-        <c:axId val="43749327"/>
+        <c:axId val="28237926"/>
+        <c:axId val="60202836"/>
       </c:barChart>
       <c:catAx>
-        <c:axId val="98198517"/>
+        <c:axId val="28237926"/>
         <c:scaling>
           <c:orientation val="minMax"/>
         </c:scaling>
@@ -270,14 +126,14 @@
             <a:round/>
           </a:ln>
         </c:spPr>
-        <c:crossAx val="43749327"/>
+        <c:crossAx val="60202836"/>
         <c:crosses val="autoZero"/>
         <c:auto val="1"/>
         <c:lblAlgn val="ctr"/>
         <c:lblOffset val="100"/>
       </c:catAx>
       <c:valAx>
-        <c:axId val="43749327"/>
+        <c:axId val="60202836"/>
         <c:scaling>
           <c:orientation val="minMax"/>
         </c:scaling>
@@ -304,7 +160,7 @@
             <a:round/>
           </a:ln>
         </c:spPr>
-        <c:crossAx val="98198517"/>
+        <c:crossAx val="28237926"/>
         <c:crosses val="autoZero"/>
       </c:valAx>
       <c:spPr>
@@ -339,7 +195,7 @@
 </c:chartSpace>
 </file>
 
-<file path=ppt/charts/chart7.xml><?xml version="1.0" encoding="utf-8"?>
+<file path=ppt/charts/chart2.xml><?xml version="1.0" encoding="utf-8"?>
 <c:chartSpace xmlns:c="http://schemas.openxmlformats.org/drawingml/2006/chart" xmlns:a="http://schemas.openxmlformats.org/drawingml/2006/main" xmlns:r="http://schemas.openxmlformats.org/officeDocument/2006/relationships">
   <c:lang val="en-US"/>
   <c:chart>
@@ -416,11 +272,11 @@
         </c:ser>
         <c:gapWidth val="100"/>
         <c:overlap val="0"/>
-        <c:axId val="27868636"/>
-        <c:axId val="38372078"/>
+        <c:axId val="36428575"/>
+        <c:axId val="22805167"/>
       </c:barChart>
       <c:catAx>
-        <c:axId val="27868636"/>
+        <c:axId val="36428575"/>
         <c:scaling>
           <c:orientation val="minMax"/>
         </c:scaling>
@@ -437,14 +293,14 @@
             <a:round/>
           </a:ln>
         </c:spPr>
-        <c:crossAx val="38372078"/>
+        <c:crossAx val="22805167"/>
         <c:crosses val="autoZero"/>
         <c:auto val="1"/>
         <c:lblAlgn val="ctr"/>
         <c:lblOffset val="100"/>
       </c:catAx>
       <c:valAx>
-        <c:axId val="38372078"/>
+        <c:axId val="22805167"/>
         <c:scaling>
           <c:orientation val="minMax"/>
         </c:scaling>
@@ -471,7 +327,7 @@
             <a:round/>
           </a:ln>
         </c:spPr>
-        <c:crossAx val="27868636"/>
+        <c:crossAx val="36428575"/>
         <c:crosses val="autoZero"/>
       </c:valAx>
       <c:spPr>
@@ -506,7 +362,7 @@
 </c:chartSpace>
 </file>
 
-<file path=ppt/charts/chart8.xml><?xml version="1.0" encoding="utf-8"?>
+<file path=ppt/charts/chart3.xml><?xml version="1.0" encoding="utf-8"?>
 <c:chartSpace xmlns:c="http://schemas.openxmlformats.org/drawingml/2006/chart" xmlns:a="http://schemas.openxmlformats.org/drawingml/2006/main" xmlns:r="http://schemas.openxmlformats.org/officeDocument/2006/relationships">
   <c:lang val="en-US"/>
   <c:chart>
@@ -583,11 +439,11 @@
         </c:ser>
         <c:gapWidth val="100"/>
         <c:overlap val="0"/>
-        <c:axId val="4364397"/>
-        <c:axId val="19729533"/>
+        <c:axId val="99700719"/>
+        <c:axId val="4929912"/>
       </c:barChart>
       <c:catAx>
-        <c:axId val="4364397"/>
+        <c:axId val="99700719"/>
         <c:scaling>
           <c:orientation val="minMax"/>
         </c:scaling>
@@ -604,14 +460,14 @@
             <a:round/>
           </a:ln>
         </c:spPr>
-        <c:crossAx val="19729533"/>
+        <c:crossAx val="4929912"/>
         <c:crosses val="autoZero"/>
         <c:auto val="1"/>
         <c:lblAlgn val="ctr"/>
         <c:lblOffset val="100"/>
       </c:catAx>
       <c:valAx>
-        <c:axId val="19729533"/>
+        <c:axId val="4929912"/>
         <c:scaling>
           <c:orientation val="minMax"/>
         </c:scaling>
@@ -638,7 +494,7 @@
             <a:round/>
           </a:ln>
         </c:spPr>
-        <c:crossAx val="4364397"/>
+        <c:crossAx val="99700719"/>
         <c:crosses val="autoZero"/>
       </c:valAx>
       <c:spPr>
@@ -673,7 +529,7 @@
 </c:chartSpace>
 </file>
 
-<file path=ppt/charts/chart9.xml><?xml version="1.0" encoding="utf-8"?>
+<file path=ppt/charts/chart4.xml><?xml version="1.0" encoding="utf-8"?>
 <c:chartSpace xmlns:c="http://schemas.openxmlformats.org/drawingml/2006/chart" xmlns:a="http://schemas.openxmlformats.org/drawingml/2006/main" xmlns:r="http://schemas.openxmlformats.org/officeDocument/2006/relationships">
   <c:lang val="en-US"/>
   <c:chart>
@@ -750,11 +606,11 @@
         </c:ser>
         <c:gapWidth val="100"/>
         <c:overlap val="0"/>
-        <c:axId val="8478426"/>
-        <c:axId val="68361334"/>
+        <c:axId val="66788084"/>
+        <c:axId val="77008262"/>
       </c:barChart>
       <c:catAx>
-        <c:axId val="8478426"/>
+        <c:axId val="66788084"/>
         <c:scaling>
           <c:orientation val="minMax"/>
         </c:scaling>
@@ -771,14 +627,14 @@
             <a:round/>
           </a:ln>
         </c:spPr>
-        <c:crossAx val="68361334"/>
+        <c:crossAx val="77008262"/>
         <c:crosses val="autoZero"/>
         <c:auto val="1"/>
         <c:lblAlgn val="ctr"/>
         <c:lblOffset val="100"/>
       </c:catAx>
       <c:valAx>
-        <c:axId val="68361334"/>
+        <c:axId val="77008262"/>
         <c:scaling>
           <c:orientation val="minMax"/>
         </c:scaling>
@@ -805,7 +661,151 @@
             <a:round/>
           </a:ln>
         </c:spPr>
-        <c:crossAx val="8478426"/>
+        <c:crossAx val="66788084"/>
+        <c:crosses val="autoZero"/>
+      </c:valAx>
+      <c:spPr>
+        <a:noFill/>
+        <a:ln>
+          <a:solidFill>
+            <a:srgbClr val="b3b3b3"/>
+          </a:solidFill>
+        </a:ln>
+      </c:spPr>
+    </c:plotArea>
+    <c:legend>
+      <c:legendPos val="r"/>
+      <c:overlay val="0"/>
+      <c:spPr>
+        <a:noFill/>
+        <a:ln>
+          <a:noFill/>
+        </a:ln>
+      </c:spPr>
+    </c:legend>
+    <c:plotVisOnly val="1"/>
+  </c:chart>
+  <c:spPr>
+    <a:solidFill>
+      <a:srgbClr val="ffffff"/>
+    </a:solidFill>
+    <a:ln>
+      <a:noFill/>
+    </a:ln>
+  </c:spPr>
+</c:chartSpace>
+</file>
+
+<file path=ppt/charts/chart5.xml><?xml version="1.0" encoding="utf-8"?>
+<c:chartSpace xmlns:c="http://schemas.openxmlformats.org/drawingml/2006/chart" xmlns:a="http://schemas.openxmlformats.org/drawingml/2006/main" xmlns:r="http://schemas.openxmlformats.org/officeDocument/2006/relationships">
+  <c:lang val="en-US"/>
+  <c:chart>
+    <c:plotArea>
+      <c:layout/>
+      <c:barChart>
+        <c:barDir val="col"/>
+        <c:grouping val="clustered"/>
+        <c:ser>
+          <c:idx val="0"/>
+          <c:order val="0"/>
+          <c:spPr>
+            <a:solidFill>
+              <a:srgbClr val="004586"/>
+            </a:solidFill>
+            <a:ln>
+              <a:noFill/>
+            </a:ln>
+          </c:spPr>
+          <c:dLbls>
+            <c:dLblPos val="ctr"/>
+            <c:showLegendKey val="0"/>
+            <c:showVal val="0"/>
+            <c:showCatName val="0"/>
+            <c:showSerName val="0"/>
+            <c:showPercent val="0"/>
+          </c:dLbls>
+          <c:cat>
+            <c:strRef>
+              <c:f>categories</c:f>
+              <c:strCache>
+                <c:ptCount val="1"/>
+                <c:pt idx="0">
+                  <c:v>Resultados</c:v>
+                </c:pt>
+              </c:strCache>
+            </c:strRef>
+          </c:cat>
+          <c:val>
+            <c:numRef>
+              <c:f>0</c:f>
+              <c:numCache>
+                <c:formatCode>General</c:formatCode>
+                <c:ptCount val="1"/>
+                <c:pt idx="0">
+                  <c:v>0.99</c:v>
+                </c:pt>
+              </c:numCache>
+            </c:numRef>
+          </c:val>
+        </c:ser>
+        <c:gapWidth val="100"/>
+        <c:overlap val="0"/>
+        <c:axId val="20748084"/>
+        <c:axId val="95044158"/>
+      </c:barChart>
+      <c:catAx>
+        <c:axId val="20748084"/>
+        <c:scaling>
+          <c:orientation val="minMax"/>
+        </c:scaling>
+        <c:delete val="0"/>
+        <c:axPos val="b"/>
+        <c:majorTickMark val="out"/>
+        <c:minorTickMark val="none"/>
+        <c:tickLblPos val="nextTo"/>
+        <c:spPr>
+          <a:ln w="9360">
+            <a:solidFill>
+              <a:srgbClr val="b3b3b3"/>
+            </a:solidFill>
+            <a:round/>
+          </a:ln>
+        </c:spPr>
+        <c:crossAx val="95044158"/>
+        <c:crosses val="autoZero"/>
+        <c:auto val="1"/>
+        <c:lblAlgn val="ctr"/>
+        <c:lblOffset val="100"/>
+      </c:catAx>
+      <c:valAx>
+        <c:axId val="95044158"/>
+        <c:scaling>
+          <c:orientation val="minMax"/>
+        </c:scaling>
+        <c:delete val="0"/>
+        <c:axPos val="l"/>
+        <c:majorGridlines>
+          <c:spPr>
+            <a:ln w="9360">
+              <a:solidFill>
+                <a:srgbClr val="b3b3b3"/>
+              </a:solidFill>
+              <a:round/>
+            </a:ln>
+          </c:spPr>
+        </c:majorGridlines>
+        <c:majorTickMark val="out"/>
+        <c:minorTickMark val="none"/>
+        <c:tickLblPos val="nextTo"/>
+        <c:spPr>
+          <a:ln w="9360">
+            <a:solidFill>
+              <a:srgbClr val="b3b3b3"/>
+            </a:solidFill>
+            <a:round/>
+          </a:ln>
+        </c:spPr>
+        <c:crossAx val="20748084"/>
         <c:crosses val="autoZero"/>
       </c:valAx>
       <c:spPr>
@@ -1224,8 +1224,8 @@
         </p:blipFill>
         <p:spPr>
           <a:xfrm>
-            <a:off x="2079000" y="1604520"/>
-            <a:ext cx="4984920" cy="3977280"/>
+            <a:off x="2077920" y="1604520"/>
+            <a:ext cx="4987080" cy="3977280"/>
           </a:xfrm>
           <a:prstGeom prst="rect">
             <a:avLst/>
@@ -1247,8 +1247,8 @@
         </p:blipFill>
         <p:spPr>
           <a:xfrm>
-            <a:off x="2079000" y="1604520"/>
-            <a:ext cx="4984920" cy="3977280"/>
+            <a:off x="2077920" y="1604520"/>
+            <a:ext cx="4987080" cy="3977280"/>
           </a:xfrm>
           <a:prstGeom prst="rect">
             <a:avLst/>
@@ -2454,8 +2454,8 @@
         </p:blipFill>
         <p:spPr>
           <a:xfrm>
-            <a:off x="2079000" y="1604520"/>
-            <a:ext cx="4984920" cy="3977280"/>
+            <a:off x="2077920" y="1604520"/>
+            <a:ext cx="4987080" cy="3977280"/>
           </a:xfrm>
           <a:prstGeom prst="rect">
             <a:avLst/>
@@ -2477,8 +2477,8 @@
         </p:blipFill>
         <p:spPr>
           <a:xfrm>
-            <a:off x="2079000" y="1604520"/>
-            <a:ext cx="4984920" cy="3977280"/>
+            <a:off x="2077920" y="1604520"/>
+            <a:ext cx="4987080" cy="3977280"/>
           </a:xfrm>
           <a:prstGeom prst="rect">
             <a:avLst/>
@@ -3184,7 +3184,7 @@
         <p:spPr>
           <a:xfrm>
             <a:off x="777240" y="0"/>
-            <a:ext cx="7538760" cy="375840"/>
+            <a:ext cx="7537320" cy="374400"/>
           </a:xfrm>
           <a:prstGeom prst="rect">
             <a:avLst/>
@@ -3217,7 +3217,7 @@
         <p:spPr>
           <a:xfrm>
             <a:off x="777240" y="6172200"/>
-            <a:ext cx="7538760" cy="22320"/>
+            <a:ext cx="7537320" cy="20880"/>
           </a:xfrm>
           <a:prstGeom prst="rect">
             <a:avLst/>
@@ -3451,7 +3451,7 @@
         <p:spPr>
           <a:xfrm>
             <a:off x="777240" y="0"/>
-            <a:ext cx="7538760" cy="375840"/>
+            <a:ext cx="7537320" cy="374400"/>
           </a:xfrm>
           <a:prstGeom prst="rect">
             <a:avLst/>
@@ -3484,7 +3484,7 @@
         <p:spPr>
           <a:xfrm>
             <a:off x="777240" y="6172200"/>
-            <a:ext cx="7538760" cy="22320"/>
+            <a:ext cx="7537320" cy="20880"/>
           </a:xfrm>
           <a:prstGeom prst="rect">
             <a:avLst/>
@@ -3708,7 +3708,7 @@
         <p:spPr>
           <a:xfrm>
             <a:off x="1012680" y="2282760"/>
-            <a:ext cx="7765920" cy="1463400"/>
+            <a:ext cx="7764480" cy="1461960"/>
           </a:xfrm>
           <a:prstGeom prst="rect">
             <a:avLst/>
@@ -3734,7 +3734,7 @@
         <p:spPr>
           <a:xfrm>
             <a:off x="457200" y="501840"/>
-            <a:ext cx="8027640" cy="1139040"/>
+            <a:ext cx="8026200" cy="1137600"/>
           </a:xfrm>
           <a:prstGeom prst="rect">
             <a:avLst/>
@@ -3781,7 +3781,7 @@
         <p:spPr>
           <a:xfrm>
             <a:off x="457200" y="1604520"/>
-            <a:ext cx="3920400" cy="3971520"/>
+            <a:ext cx="3918960" cy="3970080"/>
           </a:xfrm>
           <a:prstGeom prst="rect">
             <a:avLst/>
@@ -3904,7 +3904,7 @@
         <p:spPr>
           <a:xfrm>
             <a:off x="6948360" y="1196640"/>
-            <a:ext cx="1909440" cy="1890360"/>
+            <a:ext cx="1908000" cy="1888920"/>
           </a:xfrm>
           <a:prstGeom prst="rect">
             <a:avLst/>
@@ -3982,7 +3982,7 @@
         <p:spPr>
           <a:xfrm>
             <a:off x="457200" y="274680"/>
-            <a:ext cx="8223120" cy="1136520"/>
+            <a:ext cx="8221680" cy="1135080"/>
           </a:xfrm>
           <a:prstGeom prst="rect">
             <a:avLst/>
@@ -4029,7 +4029,7 @@
         <p:spPr>
           <a:xfrm>
             <a:off x="457200" y="1600200"/>
-            <a:ext cx="8223120" cy="4519440"/>
+            <a:ext cx="8221680" cy="4518000"/>
           </a:xfrm>
           <a:prstGeom prst="rect">
             <a:avLst/>
@@ -4055,7 +4055,7 @@
         <p:spPr>
           <a:xfrm>
             <a:off x="6365160" y="1124640"/>
-            <a:ext cx="2281680" cy="3103200"/>
+            <a:ext cx="2280240" cy="3101760"/>
           </a:xfrm>
           <a:prstGeom prst="rect">
             <a:avLst/>
@@ -4109,7 +4109,7 @@
         </p:nvGraphicFramePr>
         <p:xfrm>
           <a:off x="504720" y="1224000"/>
-          <a:ext cx="5757840" cy="3237840"/>
+          <a:ext cx="5756400" cy="3236400"/>
         </p:xfrm>
         <a:graphic>
           <a:graphicData uri="http://schemas.openxmlformats.org/drawingml/2006/chart">
@@ -4185,7 +4185,7 @@
         <p:spPr>
           <a:xfrm>
             <a:off x="457200" y="274680"/>
-            <a:ext cx="8223120" cy="1136520"/>
+            <a:ext cx="8221680" cy="1135080"/>
           </a:xfrm>
           <a:prstGeom prst="rect">
             <a:avLst/>
@@ -4232,7 +4232,7 @@
         <p:spPr>
           <a:xfrm>
             <a:off x="457200" y="1600200"/>
-            <a:ext cx="8223120" cy="4519440"/>
+            <a:ext cx="8221680" cy="4518000"/>
           </a:xfrm>
           <a:prstGeom prst="rect">
             <a:avLst/>
@@ -4258,7 +4258,7 @@
         <p:spPr>
           <a:xfrm>
             <a:off x="6183360" y="1416240"/>
-            <a:ext cx="2496960" cy="2828880"/>
+            <a:ext cx="2495520" cy="2827440"/>
           </a:xfrm>
           <a:prstGeom prst="rect">
             <a:avLst/>
@@ -4328,7 +4328,7 @@
         </p:nvGraphicFramePr>
         <p:xfrm>
           <a:off x="288000" y="1440720"/>
-          <a:ext cx="5757840" cy="3237840"/>
+          <a:ext cx="5756400" cy="3236400"/>
         </p:xfrm>
         <a:graphic>
           <a:graphicData uri="http://schemas.openxmlformats.org/drawingml/2006/chart">
@@ -4404,7 +4404,7 @@
         <p:spPr>
           <a:xfrm>
             <a:off x="457200" y="274680"/>
-            <a:ext cx="8223120" cy="1136520"/>
+            <a:ext cx="8221680" cy="1135080"/>
           </a:xfrm>
           <a:prstGeom prst="rect">
             <a:avLst/>
@@ -4451,7 +4451,7 @@
         <p:spPr>
           <a:xfrm>
             <a:off x="457200" y="1600200"/>
-            <a:ext cx="8223120" cy="4519440"/>
+            <a:ext cx="8221680" cy="4518000"/>
           </a:xfrm>
           <a:prstGeom prst="rect">
             <a:avLst/>
@@ -4477,7 +4477,7 @@
         <p:spPr>
           <a:xfrm>
             <a:off x="6647040" y="1357920"/>
-            <a:ext cx="2281680" cy="3103200"/>
+            <a:ext cx="2280240" cy="3101760"/>
           </a:xfrm>
           <a:prstGeom prst="rect">
             <a:avLst/>
@@ -4531,7 +4531,7 @@
         </p:nvGraphicFramePr>
         <p:xfrm>
           <a:off x="3672000" y="4104000"/>
-          <a:ext cx="5470560" cy="2878560"/>
+          <a:ext cx="5469120" cy="2877120"/>
         </p:xfrm>
         <a:graphic>
           <a:graphicData uri="http://schemas.openxmlformats.org/drawingml/2006/chart">
@@ -4550,9 +4550,9 @@
           <a:stretch/>
         </p:blipFill>
         <p:spPr>
-          <a:xfrm>
-            <a:off x="72000" y="1152000"/>
-            <a:ext cx="5902560" cy="3560760"/>
+          <a:xfrm rot="4200">
+            <a:off x="70200" y="1149840"/>
+            <a:ext cx="4893120" cy="2950920"/>
           </a:xfrm>
           <a:prstGeom prst="rect">
             <a:avLst/>
@@ -4630,7 +4630,7 @@
         <p:spPr>
           <a:xfrm>
             <a:off x="457200" y="274680"/>
-            <a:ext cx="8223120" cy="1136520"/>
+            <a:ext cx="8221680" cy="1135080"/>
           </a:xfrm>
           <a:prstGeom prst="rect">
             <a:avLst/>
@@ -4677,7 +4677,7 @@
         <p:spPr>
           <a:xfrm>
             <a:off x="457200" y="1600200"/>
-            <a:ext cx="8223120" cy="4519440"/>
+            <a:ext cx="8221680" cy="4518000"/>
           </a:xfrm>
           <a:prstGeom prst="rect">
             <a:avLst/>
@@ -4703,7 +4703,7 @@
         <p:spPr>
           <a:xfrm>
             <a:off x="163080" y="1113480"/>
-            <a:ext cx="8760960" cy="2554560"/>
+            <a:ext cx="8759520" cy="2553120"/>
           </a:xfrm>
           <a:prstGeom prst="rect">
             <a:avLst/>
@@ -4762,7 +4762,7 @@
         <p:spPr>
           <a:xfrm>
             <a:off x="72000" y="1929240"/>
-            <a:ext cx="4637880" cy="3181320"/>
+            <a:ext cx="4636440" cy="3179880"/>
           </a:xfrm>
           <a:prstGeom prst="rect">
             <a:avLst/>
@@ -4780,7 +4780,7 @@
         </p:nvGraphicFramePr>
         <p:xfrm>
           <a:off x="4824000" y="4608000"/>
-          <a:ext cx="4246560" cy="2229840"/>
+          <a:ext cx="4245120" cy="2228400"/>
         </p:xfrm>
         <a:graphic>
           <a:graphicData uri="http://schemas.openxmlformats.org/drawingml/2006/chart">
@@ -4856,7 +4856,7 @@
         <p:spPr>
           <a:xfrm>
             <a:off x="457200" y="274680"/>
-            <a:ext cx="8223120" cy="1136520"/>
+            <a:ext cx="8221680" cy="1135080"/>
           </a:xfrm>
           <a:prstGeom prst="rect">
             <a:avLst/>
@@ -4903,7 +4903,7 @@
         <p:spPr>
           <a:xfrm>
             <a:off x="457200" y="1600200"/>
-            <a:ext cx="8223120" cy="4519440"/>
+            <a:ext cx="8221680" cy="4518000"/>
           </a:xfrm>
           <a:prstGeom prst="rect">
             <a:avLst/>
@@ -4929,7 +4929,7 @@
         <p:spPr>
           <a:xfrm>
             <a:off x="6890760" y="1124640"/>
-            <a:ext cx="1848960" cy="3377520"/>
+            <a:ext cx="1847520" cy="3376080"/>
           </a:xfrm>
           <a:prstGeom prst="rect">
             <a:avLst/>
@@ -5043,7 +5043,7 @@
         <p:spPr>
           <a:xfrm>
             <a:off x="457200" y="274680"/>
-            <a:ext cx="8223120" cy="1136520"/>
+            <a:ext cx="8221680" cy="1135080"/>
           </a:xfrm>
           <a:prstGeom prst="rect">
             <a:avLst/>
@@ -5090,7 +5090,7 @@
         <p:spPr>
           <a:xfrm>
             <a:off x="457200" y="1600200"/>
-            <a:ext cx="8223120" cy="4519440"/>
+            <a:ext cx="8221680" cy="4518000"/>
           </a:xfrm>
           <a:prstGeom prst="rect">
             <a:avLst/>
@@ -5116,7 +5116,7 @@
         <p:spPr>
           <a:xfrm>
             <a:off x="5751360" y="1412640"/>
-            <a:ext cx="2928960" cy="2280240"/>
+            <a:ext cx="2927520" cy="2278800"/>
           </a:xfrm>
           <a:prstGeom prst="rect">
             <a:avLst/>
@@ -5170,7 +5170,7 @@
         </p:nvGraphicFramePr>
         <p:xfrm>
           <a:off x="432000" y="2952720"/>
-          <a:ext cx="5757840" cy="3237840"/>
+          <a:ext cx="5756400" cy="3236400"/>
         </p:xfrm>
         <a:graphic>
           <a:graphicData uri="http://schemas.openxmlformats.org/drawingml/2006/chart">
@@ -5246,7 +5246,7 @@
         <p:spPr>
           <a:xfrm>
             <a:off x="457200" y="273600"/>
-            <a:ext cx="8226360" cy="1141920"/>
+            <a:ext cx="8224920" cy="1140480"/>
           </a:xfrm>
           <a:prstGeom prst="rect">
             <a:avLst/>
@@ -5419,7 +5419,7 @@
         <p:spPr>
           <a:xfrm>
             <a:off x="1152000" y="3960000"/>
-            <a:ext cx="3093120" cy="599400"/>
+            <a:ext cx="3091680" cy="597960"/>
           </a:xfrm>
           <a:prstGeom prst="rect">
             <a:avLst/>
@@ -5510,7 +5510,7 @@
         <p:spPr>
           <a:xfrm>
             <a:off x="432000" y="12600"/>
-            <a:ext cx="8223120" cy="1136520"/>
+            <a:ext cx="8221680" cy="1135080"/>
           </a:xfrm>
           <a:prstGeom prst="rect">
             <a:avLst/>
@@ -5557,7 +5557,7 @@
         <p:spPr>
           <a:xfrm>
             <a:off x="457200" y="1600200"/>
-            <a:ext cx="8223120" cy="4519440"/>
+            <a:ext cx="8221680" cy="4518000"/>
           </a:xfrm>
           <a:prstGeom prst="rect">
             <a:avLst/>
@@ -6300,7 +6300,7 @@
         <p:spPr>
           <a:xfrm>
             <a:off x="432000" y="12600"/>
-            <a:ext cx="8223120" cy="1136520"/>
+            <a:ext cx="8221680" cy="1135080"/>
           </a:xfrm>
           <a:prstGeom prst="rect">
             <a:avLst/>
@@ -6347,7 +6347,7 @@
         <p:spPr>
           <a:xfrm>
             <a:off x="457200" y="1600200"/>
-            <a:ext cx="8223120" cy="4519440"/>
+            <a:ext cx="8221680" cy="4518000"/>
           </a:xfrm>
           <a:prstGeom prst="rect">
             <a:avLst/>
@@ -7090,7 +7090,7 @@
         <p:spPr>
           <a:xfrm>
             <a:off x="432000" y="12600"/>
-            <a:ext cx="8223120" cy="1136520"/>
+            <a:ext cx="8221680" cy="1135080"/>
           </a:xfrm>
           <a:prstGeom prst="rect">
             <a:avLst/>
@@ -7137,7 +7137,7 @@
         <p:spPr>
           <a:xfrm>
             <a:off x="457200" y="1600200"/>
-            <a:ext cx="8223120" cy="4519440"/>
+            <a:ext cx="8221680" cy="4518000"/>
           </a:xfrm>
           <a:prstGeom prst="rect">
             <a:avLst/>
@@ -7880,7 +7880,7 @@
         <p:spPr>
           <a:xfrm>
             <a:off x="432000" y="12600"/>
-            <a:ext cx="8223120" cy="1136520"/>
+            <a:ext cx="8221680" cy="1135080"/>
           </a:xfrm>
           <a:prstGeom prst="rect">
             <a:avLst/>
@@ -7927,7 +7927,7 @@
         <p:spPr>
           <a:xfrm>
             <a:off x="457200" y="1600200"/>
-            <a:ext cx="8223120" cy="4519440"/>
+            <a:ext cx="8221680" cy="4518000"/>
           </a:xfrm>
           <a:prstGeom prst="rect">
             <a:avLst/>
@@ -8247,7 +8247,7 @@
         <p:spPr>
           <a:xfrm>
             <a:off x="457200" y="274680"/>
-            <a:ext cx="8223120" cy="1136520"/>
+            <a:ext cx="8221680" cy="1135080"/>
           </a:xfrm>
           <a:prstGeom prst="rect">
             <a:avLst/>
@@ -8294,7 +8294,7 @@
         <p:spPr>
           <a:xfrm>
             <a:off x="457200" y="1600200"/>
-            <a:ext cx="8223120" cy="4519440"/>
+            <a:ext cx="8221680" cy="4518000"/>
           </a:xfrm>
           <a:prstGeom prst="rect">
             <a:avLst/>
@@ -8338,7 +8338,7 @@
         </p:nvGraphicFramePr>
         <p:xfrm>
           <a:off x="36360" y="1579680"/>
-          <a:ext cx="9078120" cy="4461120"/>
+          <a:ext cx="9078120" cy="4459680"/>
         </p:xfrm>
         <a:graphic>
           <a:graphicData uri="http://schemas.openxmlformats.org/drawingml/2006/table">
@@ -8901,7 +8901,7 @@
                   <a:tcPr/>
                 </a:tc>
               </a:tr>
-              <a:tr h="612000">
+              <a:tr h="610560">
                 <a:tc>
                   <a:txBody>
                     <a:bodyPr/>
@@ -9050,7 +9050,7 @@
         <p:spPr>
           <a:xfrm>
             <a:off x="576000" y="1080000"/>
-            <a:ext cx="7988040" cy="598320"/>
+            <a:ext cx="7986600" cy="596880"/>
           </a:xfrm>
           <a:prstGeom prst="rect">
             <a:avLst/>
@@ -9141,7 +9141,7 @@
         <p:spPr>
           <a:xfrm>
             <a:off x="457200" y="274680"/>
-            <a:ext cx="8223120" cy="1136520"/>
+            <a:ext cx="8221680" cy="1135080"/>
           </a:xfrm>
           <a:prstGeom prst="rect">
             <a:avLst/>
@@ -9188,7 +9188,7 @@
         <p:spPr>
           <a:xfrm>
             <a:off x="457200" y="1600200"/>
-            <a:ext cx="8223120" cy="4519440"/>
+            <a:ext cx="8221680" cy="4518000"/>
           </a:xfrm>
           <a:prstGeom prst="rect">
             <a:avLst/>
@@ -9214,7 +9214,7 @@
         <p:spPr>
           <a:xfrm>
             <a:off x="792000" y="3990240"/>
-            <a:ext cx="7987320" cy="2280240"/>
+            <a:ext cx="7985880" cy="2278800"/>
           </a:xfrm>
           <a:prstGeom prst="rect">
             <a:avLst/>
@@ -9457,6 +9457,9 @@
                       </a:pPr>
                       <a:r>
                         <a:rPr lang="es-MX" strike="noStrike">
+                          <a:solidFill>
+                            <a:srgbClr val="800000"/>
+                          </a:solidFill>
                           <a:latin typeface="Arial"/>
                         </a:rPr>
                         <a:t>-85%</a:t>
@@ -9546,6 +9549,9 @@
                       </a:pPr>
                       <a:r>
                         <a:rPr lang="es-MX" strike="noStrike">
+                          <a:solidFill>
+                            <a:srgbClr val="800000"/>
+                          </a:solidFill>
                           <a:latin typeface="Arial"/>
                         </a:rPr>
                         <a:t>-206%</a:t>
@@ -10034,7 +10040,7 @@
         <p:spPr>
           <a:xfrm>
             <a:off x="457200" y="274680"/>
-            <a:ext cx="8223120" cy="1136520"/>
+            <a:ext cx="8221680" cy="1135080"/>
           </a:xfrm>
           <a:prstGeom prst="rect">
             <a:avLst/>
@@ -10081,7 +10087,7 @@
         <p:spPr>
           <a:xfrm>
             <a:off x="457200" y="1600200"/>
-            <a:ext cx="8223120" cy="4519440"/>
+            <a:ext cx="8221680" cy="4518000"/>
           </a:xfrm>
           <a:prstGeom prst="rect">
             <a:avLst/>
@@ -10107,7 +10113,7 @@
         <p:spPr>
           <a:xfrm>
             <a:off x="864000" y="4388040"/>
-            <a:ext cx="5973480" cy="1731600"/>
+            <a:ext cx="5972040" cy="1730160"/>
           </a:xfrm>
           <a:prstGeom prst="rect">
             <a:avLst/>

</xml_diff>